<commit_message>
minor glitch in docs fixed
</commit_message>
<xml_diff>
--- a/Specs/background worker lib spec 0v4.pptx
+++ b/Specs/background worker lib spec 0v4.pptx
@@ -203,7 +203,7 @@
             <a:fld id="{0759F50D-312A-4B3C-9BEF-9C2DA2445CDD}" type="datetimeFigureOut">
               <a:rPr lang="nl-NL" smtClean="0"/>
               <a:pPr/>
-              <a:t>13-mei-2013</a:t>
+              <a:t>23-mei-2013</a:t>
             </a:fld>
             <a:endParaRPr lang="nl-NL"/>
           </a:p>
@@ -469,7 +469,7 @@
             <a:fld id="{ECA28398-DC7E-4F6E-ABC0-B2910E69C857}" type="datetimeFigureOut">
               <a:rPr lang="nl-NL" smtClean="0"/>
               <a:pPr/>
-              <a:t>13-mei-2013</a:t>
+              <a:t>23-mei-2013</a:t>
             </a:fld>
             <a:endParaRPr lang="nl-NL"/>
           </a:p>
@@ -636,7 +636,7 @@
             <a:fld id="{ECA28398-DC7E-4F6E-ABC0-B2910E69C857}" type="datetimeFigureOut">
               <a:rPr lang="nl-NL" smtClean="0"/>
               <a:pPr/>
-              <a:t>13-mei-2013</a:t>
+              <a:t>23-mei-2013</a:t>
             </a:fld>
             <a:endParaRPr lang="nl-NL"/>
           </a:p>
@@ -813,7 +813,7 @@
             <a:fld id="{ECA28398-DC7E-4F6E-ABC0-B2910E69C857}" type="datetimeFigureOut">
               <a:rPr lang="nl-NL" smtClean="0"/>
               <a:pPr/>
-              <a:t>13-mei-2013</a:t>
+              <a:t>23-mei-2013</a:t>
             </a:fld>
             <a:endParaRPr lang="nl-NL"/>
           </a:p>
@@ -980,7 +980,7 @@
             <a:fld id="{ECA28398-DC7E-4F6E-ABC0-B2910E69C857}" type="datetimeFigureOut">
               <a:rPr lang="nl-NL" smtClean="0"/>
               <a:pPr/>
-              <a:t>13-mei-2013</a:t>
+              <a:t>23-mei-2013</a:t>
             </a:fld>
             <a:endParaRPr lang="nl-NL"/>
           </a:p>
@@ -1223,7 +1223,7 @@
             <a:fld id="{ECA28398-DC7E-4F6E-ABC0-B2910E69C857}" type="datetimeFigureOut">
               <a:rPr lang="nl-NL" smtClean="0"/>
               <a:pPr/>
-              <a:t>13-mei-2013</a:t>
+              <a:t>23-mei-2013</a:t>
             </a:fld>
             <a:endParaRPr lang="nl-NL"/>
           </a:p>
@@ -1508,7 +1508,7 @@
             <a:fld id="{ECA28398-DC7E-4F6E-ABC0-B2910E69C857}" type="datetimeFigureOut">
               <a:rPr lang="nl-NL" smtClean="0"/>
               <a:pPr/>
-              <a:t>13-mei-2013</a:t>
+              <a:t>23-mei-2013</a:t>
             </a:fld>
             <a:endParaRPr lang="nl-NL"/>
           </a:p>
@@ -1927,7 +1927,7 @@
             <a:fld id="{ECA28398-DC7E-4F6E-ABC0-B2910E69C857}" type="datetimeFigureOut">
               <a:rPr lang="nl-NL" smtClean="0"/>
               <a:pPr/>
-              <a:t>13-mei-2013</a:t>
+              <a:t>23-mei-2013</a:t>
             </a:fld>
             <a:endParaRPr lang="nl-NL"/>
           </a:p>
@@ -2042,7 +2042,7 @@
             <a:fld id="{ECA28398-DC7E-4F6E-ABC0-B2910E69C857}" type="datetimeFigureOut">
               <a:rPr lang="nl-NL" smtClean="0"/>
               <a:pPr/>
-              <a:t>13-mei-2013</a:t>
+              <a:t>23-mei-2013</a:t>
             </a:fld>
             <a:endParaRPr lang="nl-NL"/>
           </a:p>
@@ -2134,7 +2134,7 @@
             <a:fld id="{ECA28398-DC7E-4F6E-ABC0-B2910E69C857}" type="datetimeFigureOut">
               <a:rPr lang="nl-NL" smtClean="0"/>
               <a:pPr/>
-              <a:t>13-mei-2013</a:t>
+              <a:t>23-mei-2013</a:t>
             </a:fld>
             <a:endParaRPr lang="nl-NL"/>
           </a:p>
@@ -2408,7 +2408,7 @@
             <a:fld id="{ECA28398-DC7E-4F6E-ABC0-B2910E69C857}" type="datetimeFigureOut">
               <a:rPr lang="nl-NL" smtClean="0"/>
               <a:pPr/>
-              <a:t>13-mei-2013</a:t>
+              <a:t>23-mei-2013</a:t>
             </a:fld>
             <a:endParaRPr lang="nl-NL"/>
           </a:p>
@@ -2658,7 +2658,7 @@
             <a:fld id="{ECA28398-DC7E-4F6E-ABC0-B2910E69C857}" type="datetimeFigureOut">
               <a:rPr lang="nl-NL" smtClean="0"/>
               <a:pPr/>
-              <a:t>13-mei-2013</a:t>
+              <a:t>23-mei-2013</a:t>
             </a:fld>
             <a:endParaRPr lang="nl-NL"/>
           </a:p>
@@ -2868,7 +2868,7 @@
             <a:fld id="{ECA28398-DC7E-4F6E-ABC0-B2910E69C857}" type="datetimeFigureOut">
               <a:rPr lang="nl-NL" smtClean="0"/>
               <a:pPr/>
-              <a:t>13-mei-2013</a:t>
+              <a:t>23-mei-2013</a:t>
             </a:fld>
             <a:endParaRPr lang="nl-NL"/>
           </a:p>
@@ -10949,15 +10949,7 @@
                   <a:schemeClr val="tx1"/>
                 </a:solidFill>
               </a:rPr>
-              <a:t>is </a:t>
-            </a:r>
-            <a:r>
-              <a:rPr lang="nl-NL" dirty="0" smtClean="0">
-                <a:solidFill>
-                  <a:schemeClr val="tx1"/>
-                </a:solidFill>
-              </a:rPr>
-              <a:t>added to the </a:t>
+              <a:t>is added to the </a:t>
             </a:r>
             <a:r>
               <a:rPr lang="nl-NL" sz="1400" dirty="0" smtClean="0">
@@ -12278,23 +12270,7 @@
             <a:pPr algn="ctr"/>
             <a:r>
               <a:rPr lang="nl-NL" dirty="0" smtClean="0"/>
-              <a:t>2: </a:t>
-            </a:r>
-            <a:r>
-              <a:rPr lang="nl-NL" dirty="0" smtClean="0"/>
-              <a:t>the </a:t>
-            </a:r>
-            <a:r>
-              <a:rPr lang="nl-NL" dirty="0" smtClean="0"/>
-              <a:t>call back </a:t>
-            </a:r>
-            <a:r>
-              <a:rPr lang="nl-NL" dirty="0" smtClean="0"/>
-              <a:t>calls </a:t>
-            </a:r>
-            <a:r>
-              <a:rPr lang="nl-NL" dirty="0" smtClean="0"/>
-              <a:t>the </a:t>
+              <a:t>2: the call back calls the </a:t>
             </a:r>
             <a:r>
               <a:rPr lang="nl-NL" sz="1400" dirty="0" err="1" smtClean="0">
@@ -12359,7 +12335,7 @@
         <p:spPr>
           <a:xfrm>
             <a:off x="4499992" y="908720"/>
-            <a:ext cx="2880320" cy="1584176"/>
+            <a:ext cx="3240360" cy="1584176"/>
           </a:xfrm>
           <a:prstGeom prst="borderCallout2">
             <a:avLst>
@@ -12398,11 +12374,18 @@
               <a:t>3: </a:t>
             </a:r>
             <a:r>
-              <a:rPr lang="nl-NL" sz="1400" dirty="0" smtClean="0">
+              <a:rPr lang="nl-NL" sz="1400" dirty="0" err="1">
                 <a:latin typeface="Courier New" pitchFamily="49" charset="0"/>
                 <a:cs typeface="Courier New" pitchFamily="49" charset="0"/>
               </a:rPr>
-              <a:t>setresult() </a:t>
+              <a:t>waitingthread_callback</a:t>
+            </a:r>
+            <a:r>
+              <a:rPr lang="nl-NL" sz="1400" dirty="0">
+                <a:latin typeface="Courier New" pitchFamily="49" charset="0"/>
+                <a:cs typeface="Courier New" pitchFamily="49" charset="0"/>
+              </a:rPr>
+              <a:t>() </a:t>
             </a:r>
             <a:r>
               <a:rPr lang="nl-NL" dirty="0" smtClean="0"/>

</xml_diff>